<commit_message>
passe sur la relecture de thierry de w6
</commit_message>
<xml_diff>
--- a/w6/w6-s5-av-slide1.pptx
+++ b/w6/w6-s5-av-slide1.pptx
@@ -9835,7 +9835,21 @@
                 <a:latin typeface="Calibri" panose="020F0502020204030204" pitchFamily="34" charset="0"/>
                 <a:cs typeface="Calibri" panose="020F0502020204030204" pitchFamily="34" charset="0"/>
               </a:rPr>
-              <a:t>On saute le bloque de code des classes englobantes</a:t>
+              <a:t>On saute le </a:t>
+            </a:r>
+            <a:r>
+              <a:rPr lang="fr-FR" sz="4000" dirty="0" smtClean="0">
+                <a:latin typeface="Calibri" panose="020F0502020204030204" pitchFamily="34" charset="0"/>
+                <a:cs typeface="Calibri" panose="020F0502020204030204" pitchFamily="34" charset="0"/>
+              </a:rPr>
+              <a:t>bloc </a:t>
+            </a:r>
+            <a:r>
+              <a:rPr lang="fr-FR" sz="4000" dirty="0" smtClean="0">
+                <a:latin typeface="Calibri" panose="020F0502020204030204" pitchFamily="34" charset="0"/>
+                <a:cs typeface="Calibri" panose="020F0502020204030204" pitchFamily="34" charset="0"/>
+              </a:rPr>
+              <a:t>de code des classes englobantes</a:t>
             </a:r>
           </a:p>
         </p:txBody>
@@ -10099,15 +10113,7 @@
                 <a:cs typeface="Courier New" panose="02070309020205020404" pitchFamily="49" charset="0"/>
                 <a:sym typeface="Wingdings" panose="05000000000000000000" pitchFamily="2" charset="2"/>
               </a:rPr>
-              <a:t>ins = C</a:t>
-            </a:r>
-            <a:r>
-              <a:rPr lang="en-US" sz="2400" dirty="0" smtClean="0">
-                <a:latin typeface="Courier New" panose="02070309020205020404" pitchFamily="49" charset="0"/>
-                <a:cs typeface="Courier New" panose="02070309020205020404" pitchFamily="49" charset="0"/>
-                <a:sym typeface="Wingdings" panose="05000000000000000000" pitchFamily="2" charset="2"/>
-              </a:rPr>
-              <a:t>()</a:t>
+              <a:t>ins = C()</a:t>
             </a:r>
             <a:endParaRPr lang="en-US" sz="2400" dirty="0">
               <a:latin typeface="Courier New" panose="02070309020205020404" pitchFamily="49" charset="0"/>

</xml_diff>